<commit_message>
Fixed spelling markers in pictures
</commit_message>
<xml_diff>
--- a/blogs-external/2017/Eclipse-Newsletter/Images.pptx
+++ b/blogs-external/2017/Eclipse-Newsletter/Images.pptx
@@ -176,7 +176,7 @@
             </a:lvl1pPr>
           </a:lstStyle>
           <a:p>
-            <a:endParaRPr lang="en-US"/>
+            <a:endParaRPr lang="en-US" dirty="0"/>
           </a:p>
         </p:txBody>
       </p:sp>
@@ -209,9 +209,9 @@
           <a:p>
             <a:fld id="{69AC65B7-21B3-4C22-AB43-8D67E4B7E755}" type="datetimeFigureOut">
               <a:rPr lang="en-US" smtClean="0"/>
-              <a:t>04-May-17</a:t>
+              <a:t>11-May-17</a:t>
             </a:fld>
-            <a:endParaRPr lang="en-US"/>
+            <a:endParaRPr lang="en-US" dirty="0"/>
           </a:p>
         </p:txBody>
       </p:sp>
@@ -244,7 +244,7 @@
           <a:bodyPr vert="horz" lIns="91440" tIns="45720" rIns="91440" bIns="45720" rtlCol="0" anchor="ctr"/>
           <a:lstStyle/>
           <a:p>
-            <a:endParaRPr lang="en-US"/>
+            <a:endParaRPr lang="en-US" dirty="0"/>
           </a:p>
         </p:txBody>
       </p:sp>
@@ -334,7 +334,7 @@
             </a:lvl1pPr>
           </a:lstStyle>
           <a:p>
-            <a:endParaRPr lang="en-US"/>
+            <a:endParaRPr lang="en-US" dirty="0"/>
           </a:p>
         </p:txBody>
       </p:sp>
@@ -369,7 +369,7 @@
               <a:rPr lang="en-US" smtClean="0"/>
               <a:t>‹#›</a:t>
             </a:fld>
-            <a:endParaRPr lang="en-US"/>
+            <a:endParaRPr lang="en-US" dirty="0"/>
           </a:p>
         </p:txBody>
       </p:sp>
@@ -520,7 +520,7 @@
           <a:bodyPr/>
           <a:lstStyle/>
           <a:p>
-            <a:endParaRPr lang="en-US"/>
+            <a:endParaRPr lang="en-US" dirty="0"/>
           </a:p>
         </p:txBody>
       </p:sp>
@@ -543,7 +543,7 @@
               <a:rPr lang="en-US" smtClean="0"/>
               <a:t>1</a:t>
             </a:fld>
-            <a:endParaRPr lang="en-US"/>
+            <a:endParaRPr lang="en-US" dirty="0"/>
           </a:p>
         </p:txBody>
       </p:sp>
@@ -604,7 +604,7 @@
           <a:bodyPr/>
           <a:lstStyle/>
           <a:p>
-            <a:endParaRPr lang="en-US"/>
+            <a:endParaRPr lang="en-US" dirty="0"/>
           </a:p>
         </p:txBody>
       </p:sp>
@@ -627,7 +627,7 @@
               <a:rPr lang="en-US" smtClean="0"/>
               <a:t>2</a:t>
             </a:fld>
-            <a:endParaRPr lang="en-US"/>
+            <a:endParaRPr lang="en-US" dirty="0"/>
           </a:p>
         </p:txBody>
       </p:sp>
@@ -773,9 +773,9 @@
           <a:p>
             <a:fld id="{81FE7E88-6545-4363-B08F-6545C2279B05}" type="datetimeFigureOut">
               <a:rPr lang="en-US" smtClean="0"/>
-              <a:t>04-May-17</a:t>
+              <a:t>11-May-17</a:t>
             </a:fld>
-            <a:endParaRPr lang="en-US"/>
+            <a:endParaRPr lang="en-US" dirty="0"/>
           </a:p>
         </p:txBody>
       </p:sp>
@@ -794,7 +794,7 @@
           <a:bodyPr/>
           <a:lstStyle/>
           <a:p>
-            <a:endParaRPr lang="en-US"/>
+            <a:endParaRPr lang="en-US" dirty="0"/>
           </a:p>
         </p:txBody>
       </p:sp>
@@ -817,7 +817,7 @@
               <a:rPr lang="en-US" smtClean="0"/>
               <a:t>‹#›</a:t>
             </a:fld>
-            <a:endParaRPr lang="en-US"/>
+            <a:endParaRPr lang="en-US" dirty="0"/>
           </a:p>
         </p:txBody>
       </p:sp>
@@ -941,9 +941,9 @@
           <a:p>
             <a:fld id="{81FE7E88-6545-4363-B08F-6545C2279B05}" type="datetimeFigureOut">
               <a:rPr lang="en-US" smtClean="0"/>
-              <a:t>04-May-17</a:t>
+              <a:t>11-May-17</a:t>
             </a:fld>
-            <a:endParaRPr lang="en-US"/>
+            <a:endParaRPr lang="en-US" dirty="0"/>
           </a:p>
         </p:txBody>
       </p:sp>
@@ -962,7 +962,7 @@
           <a:bodyPr/>
           <a:lstStyle/>
           <a:p>
-            <a:endParaRPr lang="en-US"/>
+            <a:endParaRPr lang="en-US" dirty="0"/>
           </a:p>
         </p:txBody>
       </p:sp>
@@ -985,7 +985,7 @@
               <a:rPr lang="en-US" smtClean="0"/>
               <a:t>‹#›</a:t>
             </a:fld>
-            <a:endParaRPr lang="en-US"/>
+            <a:endParaRPr lang="en-US" dirty="0"/>
           </a:p>
         </p:txBody>
       </p:sp>
@@ -1119,9 +1119,9 @@
           <a:p>
             <a:fld id="{81FE7E88-6545-4363-B08F-6545C2279B05}" type="datetimeFigureOut">
               <a:rPr lang="en-US" smtClean="0"/>
-              <a:t>04-May-17</a:t>
+              <a:t>11-May-17</a:t>
             </a:fld>
-            <a:endParaRPr lang="en-US"/>
+            <a:endParaRPr lang="en-US" dirty="0"/>
           </a:p>
         </p:txBody>
       </p:sp>
@@ -1140,7 +1140,7 @@
           <a:bodyPr/>
           <a:lstStyle/>
           <a:p>
-            <a:endParaRPr lang="en-US"/>
+            <a:endParaRPr lang="en-US" dirty="0"/>
           </a:p>
         </p:txBody>
       </p:sp>
@@ -1163,7 +1163,7 @@
               <a:rPr lang="en-US" smtClean="0"/>
               <a:t>‹#›</a:t>
             </a:fld>
-            <a:endParaRPr lang="en-US"/>
+            <a:endParaRPr lang="en-US" dirty="0"/>
           </a:p>
         </p:txBody>
       </p:sp>
@@ -1287,9 +1287,9 @@
           <a:p>
             <a:fld id="{81FE7E88-6545-4363-B08F-6545C2279B05}" type="datetimeFigureOut">
               <a:rPr lang="en-US" smtClean="0"/>
-              <a:t>04-May-17</a:t>
+              <a:t>11-May-17</a:t>
             </a:fld>
-            <a:endParaRPr lang="en-US"/>
+            <a:endParaRPr lang="en-US" dirty="0"/>
           </a:p>
         </p:txBody>
       </p:sp>
@@ -1308,7 +1308,7 @@
           <a:bodyPr/>
           <a:lstStyle/>
           <a:p>
-            <a:endParaRPr lang="en-US"/>
+            <a:endParaRPr lang="en-US" dirty="0"/>
           </a:p>
         </p:txBody>
       </p:sp>
@@ -1331,7 +1331,7 @@
               <a:rPr lang="en-US" smtClean="0"/>
               <a:t>‹#›</a:t>
             </a:fld>
-            <a:endParaRPr lang="en-US"/>
+            <a:endParaRPr lang="en-US" dirty="0"/>
           </a:p>
         </p:txBody>
       </p:sp>
@@ -1532,9 +1532,9 @@
           <a:p>
             <a:fld id="{81FE7E88-6545-4363-B08F-6545C2279B05}" type="datetimeFigureOut">
               <a:rPr lang="en-US" smtClean="0"/>
-              <a:t>04-May-17</a:t>
+              <a:t>11-May-17</a:t>
             </a:fld>
-            <a:endParaRPr lang="en-US"/>
+            <a:endParaRPr lang="en-US" dirty="0"/>
           </a:p>
         </p:txBody>
       </p:sp>
@@ -1553,7 +1553,7 @@
           <a:bodyPr/>
           <a:lstStyle/>
           <a:p>
-            <a:endParaRPr lang="en-US"/>
+            <a:endParaRPr lang="en-US" dirty="0"/>
           </a:p>
         </p:txBody>
       </p:sp>
@@ -1576,7 +1576,7 @@
               <a:rPr lang="en-US" smtClean="0"/>
               <a:t>‹#›</a:t>
             </a:fld>
-            <a:endParaRPr lang="en-US"/>
+            <a:endParaRPr lang="en-US" dirty="0"/>
           </a:p>
         </p:txBody>
       </p:sp>
@@ -1761,9 +1761,9 @@
           <a:p>
             <a:fld id="{81FE7E88-6545-4363-B08F-6545C2279B05}" type="datetimeFigureOut">
               <a:rPr lang="en-US" smtClean="0"/>
-              <a:t>04-May-17</a:t>
+              <a:t>11-May-17</a:t>
             </a:fld>
-            <a:endParaRPr lang="en-US"/>
+            <a:endParaRPr lang="en-US" dirty="0"/>
           </a:p>
         </p:txBody>
       </p:sp>
@@ -1782,7 +1782,7 @@
           <a:bodyPr/>
           <a:lstStyle/>
           <a:p>
-            <a:endParaRPr lang="en-US"/>
+            <a:endParaRPr lang="en-US" dirty="0"/>
           </a:p>
         </p:txBody>
       </p:sp>
@@ -1805,7 +1805,7 @@
               <a:rPr lang="en-US" smtClean="0"/>
               <a:t>‹#›</a:t>
             </a:fld>
-            <a:endParaRPr lang="en-US"/>
+            <a:endParaRPr lang="en-US" dirty="0"/>
           </a:p>
         </p:txBody>
       </p:sp>
@@ -2125,9 +2125,9 @@
           <a:p>
             <a:fld id="{81FE7E88-6545-4363-B08F-6545C2279B05}" type="datetimeFigureOut">
               <a:rPr lang="en-US" smtClean="0"/>
-              <a:t>04-May-17</a:t>
+              <a:t>11-May-17</a:t>
             </a:fld>
-            <a:endParaRPr lang="en-US"/>
+            <a:endParaRPr lang="en-US" dirty="0"/>
           </a:p>
         </p:txBody>
       </p:sp>
@@ -2146,7 +2146,7 @@
           <a:bodyPr/>
           <a:lstStyle/>
           <a:p>
-            <a:endParaRPr lang="en-US"/>
+            <a:endParaRPr lang="en-US" dirty="0"/>
           </a:p>
         </p:txBody>
       </p:sp>
@@ -2169,7 +2169,7 @@
               <a:rPr lang="en-US" smtClean="0"/>
               <a:t>‹#›</a:t>
             </a:fld>
-            <a:endParaRPr lang="en-US"/>
+            <a:endParaRPr lang="en-US" dirty="0"/>
           </a:p>
         </p:txBody>
       </p:sp>
@@ -2242,9 +2242,9 @@
           <a:p>
             <a:fld id="{81FE7E88-6545-4363-B08F-6545C2279B05}" type="datetimeFigureOut">
               <a:rPr lang="en-US" smtClean="0"/>
-              <a:t>04-May-17</a:t>
+              <a:t>11-May-17</a:t>
             </a:fld>
-            <a:endParaRPr lang="en-US"/>
+            <a:endParaRPr lang="en-US" dirty="0"/>
           </a:p>
         </p:txBody>
       </p:sp>
@@ -2263,7 +2263,7 @@
           <a:bodyPr/>
           <a:lstStyle/>
           <a:p>
-            <a:endParaRPr lang="en-US"/>
+            <a:endParaRPr lang="en-US" dirty="0"/>
           </a:p>
         </p:txBody>
       </p:sp>
@@ -2286,7 +2286,7 @@
               <a:rPr lang="en-US" smtClean="0"/>
               <a:t>‹#›</a:t>
             </a:fld>
-            <a:endParaRPr lang="en-US"/>
+            <a:endParaRPr lang="en-US" dirty="0"/>
           </a:p>
         </p:txBody>
       </p:sp>
@@ -2337,9 +2337,9 @@
           <a:p>
             <a:fld id="{81FE7E88-6545-4363-B08F-6545C2279B05}" type="datetimeFigureOut">
               <a:rPr lang="en-US" smtClean="0"/>
-              <a:t>04-May-17</a:t>
+              <a:t>11-May-17</a:t>
             </a:fld>
-            <a:endParaRPr lang="en-US"/>
+            <a:endParaRPr lang="en-US" dirty="0"/>
           </a:p>
         </p:txBody>
       </p:sp>
@@ -2358,7 +2358,7 @@
           <a:bodyPr/>
           <a:lstStyle/>
           <a:p>
-            <a:endParaRPr lang="en-US"/>
+            <a:endParaRPr lang="en-US" dirty="0"/>
           </a:p>
         </p:txBody>
       </p:sp>
@@ -2381,7 +2381,7 @@
               <a:rPr lang="en-US" smtClean="0"/>
               <a:t>‹#›</a:t>
             </a:fld>
-            <a:endParaRPr lang="en-US"/>
+            <a:endParaRPr lang="en-US" dirty="0"/>
           </a:p>
         </p:txBody>
       </p:sp>
@@ -2612,9 +2612,9 @@
           <a:p>
             <a:fld id="{81FE7E88-6545-4363-B08F-6545C2279B05}" type="datetimeFigureOut">
               <a:rPr lang="en-US" smtClean="0"/>
-              <a:t>04-May-17</a:t>
+              <a:t>11-May-17</a:t>
             </a:fld>
-            <a:endParaRPr lang="en-US"/>
+            <a:endParaRPr lang="en-US" dirty="0"/>
           </a:p>
         </p:txBody>
       </p:sp>
@@ -2633,7 +2633,7 @@
           <a:bodyPr/>
           <a:lstStyle/>
           <a:p>
-            <a:endParaRPr lang="en-US"/>
+            <a:endParaRPr lang="en-US" dirty="0"/>
           </a:p>
         </p:txBody>
       </p:sp>
@@ -2656,7 +2656,7 @@
               <a:rPr lang="en-US" smtClean="0"/>
               <a:t>‹#›</a:t>
             </a:fld>
-            <a:endParaRPr lang="en-US"/>
+            <a:endParaRPr lang="en-US" dirty="0"/>
           </a:p>
         </p:txBody>
       </p:sp>
@@ -2778,7 +2778,7 @@
             </a:lvl9pPr>
           </a:lstStyle>
           <a:p>
-            <a:endParaRPr lang="en-US"/>
+            <a:endParaRPr lang="en-US" dirty="0"/>
           </a:p>
         </p:txBody>
       </p:sp>
@@ -2864,9 +2864,9 @@
           <a:p>
             <a:fld id="{81FE7E88-6545-4363-B08F-6545C2279B05}" type="datetimeFigureOut">
               <a:rPr lang="en-US" smtClean="0"/>
-              <a:t>04-May-17</a:t>
+              <a:t>11-May-17</a:t>
             </a:fld>
-            <a:endParaRPr lang="en-US"/>
+            <a:endParaRPr lang="en-US" dirty="0"/>
           </a:p>
         </p:txBody>
       </p:sp>
@@ -2885,7 +2885,7 @@
           <a:bodyPr/>
           <a:lstStyle/>
           <a:p>
-            <a:endParaRPr lang="en-US"/>
+            <a:endParaRPr lang="en-US" dirty="0"/>
           </a:p>
         </p:txBody>
       </p:sp>
@@ -2908,7 +2908,7 @@
               <a:rPr lang="en-US" smtClean="0"/>
               <a:t>‹#›</a:t>
             </a:fld>
-            <a:endParaRPr lang="en-US"/>
+            <a:endParaRPr lang="en-US" dirty="0"/>
           </a:p>
         </p:txBody>
       </p:sp>
@@ -3075,9 +3075,9 @@
           <a:p>
             <a:fld id="{81FE7E88-6545-4363-B08F-6545C2279B05}" type="datetimeFigureOut">
               <a:rPr lang="en-US" smtClean="0"/>
-              <a:t>04-May-17</a:t>
+              <a:t>11-May-17</a:t>
             </a:fld>
-            <a:endParaRPr lang="en-US"/>
+            <a:endParaRPr lang="en-US" dirty="0"/>
           </a:p>
         </p:txBody>
       </p:sp>
@@ -3114,7 +3114,7 @@
             </a:lvl1pPr>
           </a:lstStyle>
           <a:p>
-            <a:endParaRPr lang="en-US"/>
+            <a:endParaRPr lang="en-US" dirty="0"/>
           </a:p>
         </p:txBody>
       </p:sp>
@@ -3155,7 +3155,7 @@
               <a:rPr lang="en-US" smtClean="0"/>
               <a:t>‹#›</a:t>
             </a:fld>
-            <a:endParaRPr lang="en-US"/>
+            <a:endParaRPr lang="en-US" dirty="0"/>
           </a:p>
         </p:txBody>
       </p:sp>
@@ -3783,26 +3783,10 @@
             </a:r>
             <a:r>
               <a:rPr lang="en-US" sz="1200" dirty="0"/>
-              <a:t>: </a:t>
-            </a:r>
-            <a:r>
-              <a:rPr lang="en-US" sz="1200" dirty="0" err="1"/>
-              <a:t>textDocument</a:t>
-            </a:r>
-            <a:r>
-              <a:rPr lang="en-US" sz="1200" dirty="0"/>
-              <a:t>/</a:t>
-            </a:r>
-            <a:r>
-              <a:rPr lang="en-US" sz="1200" dirty="0" err="1"/>
-              <a:t>didOpen</a:t>
-            </a:r>
-            <a:r>
-              <a:rPr lang="en-US" sz="1200" dirty="0"/>
-              <a:t>; </a:t>
-            </a:r>
-            <a:r>
-              <a:rPr lang="en-US" sz="1200" i="1" dirty="0" err="1"/>
+              <a:t>: textDocument/didOpen; </a:t>
+            </a:r>
+            <a:r>
+              <a:rPr lang="en-US" sz="1200" i="1" dirty="0"/>
               <a:t>Params</a:t>
             </a:r>
             <a:r>
@@ -3906,39 +3890,15 @@
             </a:r>
             <a:r>
               <a:rPr lang="en-US" sz="1200" dirty="0"/>
-              <a:t>: </a:t>
-            </a:r>
-            <a:r>
-              <a:rPr lang="en-US" sz="1200" dirty="0" err="1"/>
-              <a:t>textDocument</a:t>
+              <a:t>: textDocument/didChange; </a:t>
+            </a:r>
+            <a:r>
+              <a:rPr lang="en-US" sz="1200" i="1" dirty="0"/>
+              <a:t>Params</a:t>
             </a:r>
             <a:r>
               <a:rPr lang="en-US" sz="1200" dirty="0"/>
-              <a:t>/</a:t>
-            </a:r>
-            <a:r>
-              <a:rPr lang="en-US" sz="1200" dirty="0" err="1"/>
-              <a:t>didChange</a:t>
-            </a:r>
-            <a:r>
-              <a:rPr lang="en-US" sz="1200" dirty="0"/>
-              <a:t>; </a:t>
-            </a:r>
-            <a:r>
-              <a:rPr lang="en-US" sz="1200" i="1" dirty="0" err="1"/>
-              <a:t>Params</a:t>
-            </a:r>
-            <a:r>
-              <a:rPr lang="en-US" sz="1200" dirty="0"/>
-              <a:t>: {</a:t>
-            </a:r>
-            <a:r>
-              <a:rPr lang="en-US" sz="1200" dirty="0" err="1"/>
-              <a:t>documentURI</a:t>
-            </a:r>
-            <a:r>
-              <a:rPr lang="en-US" sz="1200" dirty="0"/>
-              <a:t>, changes}</a:t>
+              <a:t>: {documentURI, changes}</a:t>
             </a:r>
             <a:endParaRPr lang="en-US" sz="1100" dirty="0"/>
           </a:p>
@@ -4045,26 +4005,10 @@
             </a:r>
             <a:r>
               <a:rPr lang="en-US" sz="1200" dirty="0"/>
-              <a:t>: </a:t>
-            </a:r>
-            <a:r>
-              <a:rPr lang="en-US" sz="1200" dirty="0" err="1"/>
-              <a:t>textDocument</a:t>
-            </a:r>
-            <a:r>
-              <a:rPr lang="en-US" sz="1200" dirty="0"/>
-              <a:t>/</a:t>
-            </a:r>
-            <a:r>
-              <a:rPr lang="en-US" sz="1200" dirty="0" err="1"/>
-              <a:t>publishDiagnostics</a:t>
-            </a:r>
-            <a:r>
-              <a:rPr lang="en-US" sz="1200" dirty="0"/>
-              <a:t>; </a:t>
-            </a:r>
-            <a:r>
-              <a:rPr lang="en-US" sz="1200" i="1" dirty="0" err="1"/>
+              <a:t>: textDocument/publishDiagnostics; </a:t>
+            </a:r>
+            <a:r>
+              <a:rPr lang="en-US" sz="1200" i="1" dirty="0"/>
               <a:t>Params</a:t>
             </a:r>
             <a:r>
@@ -4137,31 +4081,15 @@
             </a:r>
             <a:r>
               <a:rPr lang="en-US" sz="1200" dirty="0"/>
-              <a:t>: </a:t>
-            </a:r>
-            <a:r>
-              <a:rPr lang="en-US" sz="1200" dirty="0" err="1"/>
-              <a:t>textDocument</a:t>
+              <a:t>: textDocument/definition </a:t>
+            </a:r>
+            <a:r>
+              <a:rPr lang="en-US" sz="1200" i="1" dirty="0"/>
+              <a:t>Params</a:t>
             </a:r>
             <a:r>
               <a:rPr lang="en-US" sz="1200" dirty="0"/>
-              <a:t>/definition </a:t>
-            </a:r>
-            <a:r>
-              <a:rPr lang="en-US" sz="1200" i="1" dirty="0" err="1"/>
-              <a:t>Params</a:t>
-            </a:r>
-            <a:r>
-              <a:rPr lang="en-US" sz="1200" dirty="0"/>
-              <a:t>: {</a:t>
-            </a:r>
-            <a:r>
-              <a:rPr lang="en-US" sz="1200" dirty="0" err="1"/>
-              <a:t>documentURI</a:t>
-            </a:r>
-            <a:r>
-              <a:rPr lang="en-US" sz="1200" dirty="0"/>
-              <a:t>, position}</a:t>
+              <a:t>: {documentURI, position}</a:t>
             </a:r>
             <a:endParaRPr lang="en-US" sz="1100" dirty="0"/>
           </a:p>
@@ -4230,15 +4158,7 @@
             </a:r>
             <a:r>
               <a:rPr lang="en-US" sz="1200" dirty="0"/>
-              <a:t>: </a:t>
-            </a:r>
-            <a:r>
-              <a:rPr lang="en-US" sz="1200" dirty="0" err="1"/>
-              <a:t>textDocument</a:t>
-            </a:r>
-            <a:r>
-              <a:rPr lang="en-US" sz="1200" dirty="0"/>
-              <a:t>/definition; </a:t>
+              <a:t>: textDocument/definition; </a:t>
             </a:r>
             <a:r>
               <a:rPr lang="en-US" sz="1200" i="1" dirty="0"/>
@@ -4284,15 +4204,7 @@
             </a:br>
             <a:r>
               <a:rPr lang="en-US" sz="1200" dirty="0"/>
-              <a:t>“</a:t>
-            </a:r>
-            <a:r>
-              <a:rPr lang="en-US" sz="1200" dirty="0" err="1"/>
-              <a:t>Goto</a:t>
-            </a:r>
-            <a:r>
-              <a:rPr lang="en-US" sz="1200" dirty="0"/>
-              <a:t> definition”</a:t>
+              <a:t>“Goto definition”</a:t>
             </a:r>
             <a:endParaRPr lang="en-US" sz="1100" dirty="0"/>
           </a:p>
@@ -4391,35 +4303,15 @@
             </a:r>
             <a:r>
               <a:rPr lang="en-US" sz="1200" dirty="0"/>
-              <a:t>: </a:t>
-            </a:r>
-            <a:r>
-              <a:rPr lang="en-US" sz="1200" dirty="0" err="1"/>
-              <a:t>textDocument</a:t>
+              <a:t>: textDocument/didClose; </a:t>
+            </a:r>
+            <a:r>
+              <a:rPr lang="en-US" sz="1200" i="1" dirty="0"/>
+              <a:t>Params</a:t>
             </a:r>
             <a:r>
               <a:rPr lang="en-US" sz="1200" dirty="0"/>
-              <a:t>/</a:t>
-            </a:r>
-            <a:r>
-              <a:rPr lang="en-US" sz="1200" dirty="0" err="1"/>
-              <a:t>didClose</a:t>
-            </a:r>
-            <a:r>
-              <a:rPr lang="en-US" sz="1200" dirty="0"/>
-              <a:t>; </a:t>
-            </a:r>
-            <a:r>
-              <a:rPr lang="en-US" sz="1200" i="1" dirty="0" err="1"/>
-              <a:t>Params</a:t>
-            </a:r>
-            <a:r>
-              <a:rPr lang="en-US" sz="1200" dirty="0"/>
-              <a:t>: </a:t>
-            </a:r>
-            <a:r>
-              <a:rPr lang="en-US" sz="1200" dirty="0" err="1"/>
-              <a:t>documentURI</a:t>
+              <a:t>: documentURI</a:t>
             </a:r>
             <a:endParaRPr lang="en-US" sz="1100" dirty="0"/>
           </a:p>
@@ -4743,15 +4635,7 @@
           <a:p>
             <a:r>
               <a:rPr lang="en-US" sz="1200" dirty="0"/>
-              <a:t>Request: ‘</a:t>
-            </a:r>
-            <a:r>
-              <a:rPr lang="en-US" sz="1200" dirty="0" err="1"/>
-              <a:t>textDocument</a:t>
-            </a:r>
-            <a:r>
-              <a:rPr lang="en-US" sz="1200" dirty="0"/>
-              <a:t>/definition’</a:t>
+              <a:t>Request: ‘textDocument/definition’</a:t>
             </a:r>
           </a:p>
         </p:txBody>
@@ -4914,15 +4798,7 @@
           <a:p>
             <a:r>
               <a:rPr lang="en-US" sz="1200" dirty="0"/>
-              <a:t>Request: ‘</a:t>
-            </a:r>
-            <a:r>
-              <a:rPr lang="en-US" sz="1200" dirty="0" err="1"/>
-              <a:t>textDocument</a:t>
-            </a:r>
-            <a:r>
-              <a:rPr lang="en-US" sz="1200" dirty="0"/>
-              <a:t>/definition’</a:t>
+              <a:t>Request: ‘textDocument/definition’</a:t>
             </a:r>
           </a:p>
         </p:txBody>
@@ -5088,10 +4964,9 @@
           <a:p>
             <a:pPr algn="ctr"/>
             <a:r>
-              <a:rPr lang="en-US" sz="1400" dirty="0" err="1"/>
+              <a:rPr lang="en-US" sz="1400" dirty="0"/>
               <a:t>Saas</a:t>
             </a:r>
-            <a:endParaRPr lang="en-US" sz="1400" dirty="0"/>
           </a:p>
         </p:txBody>
       </p:sp>

</xml_diff>